<commit_message>
update eng slide 0904 fomula
</commit_message>
<xml_diff>
--- a/slide_0904/20190904_urita_eng.pptx
+++ b/slide_0904/20190904_urita_eng.pptx
@@ -11,7 +11,6 @@
     <p:sldId id="261" r:id="rId5"/>
     <p:sldId id="263" r:id="rId6"/>
     <p:sldId id="262" r:id="rId7"/>
-    <p:sldId id="264" r:id="rId8"/>
   </p:sldIdLst>
   <p:sldSz cx="9144000" cy="6858000" type="screen4x3"/>
   <p:notesSz cx="6858000" cy="9144000"/>
@@ -667,11 +666,6 @@
               </a:rPr>
               <a:t>論文情報</a:t>
             </a:r>
-            <a:endParaRPr kumimoji="1" lang="ja-JP" altLang="en-US" sz="4400" b="1" dirty="0" smtClean="0">
-              <a:solidFill>
-                <a:schemeClr val="bg1"/>
-              </a:solidFill>
-            </a:endParaRPr>
           </a:p>
         </p:txBody>
       </p:sp>
@@ -2880,8 +2874,8 @@
           </a:p>
         </p:txBody>
       </p:sp>
-      <mc:AlternateContent xmlns:mc="http://schemas.openxmlformats.org/markup-compatibility/2006">
-        <mc:Choice xmlns:a14="http://schemas.microsoft.com/office/drawing/2010/main" Requires="a14">
+      <mc:AlternateContent xmlns:mc="http://schemas.openxmlformats.org/markup-compatibility/2006" xmlns:a14="http://schemas.microsoft.com/office/drawing/2010/main">
+        <mc:Choice Requires="a14">
           <p:sp>
             <p:nvSpPr>
               <p:cNvPr id="3" name="コンテンツ プレースホルダー 2"/>
@@ -3067,7 +3061,7 @@
             </p:txBody>
           </p:sp>
         </mc:Choice>
-        <mc:Fallback>
+        <mc:Fallback xmlns="">
           <p:sp>
             <p:nvSpPr>
               <p:cNvPr id="3" name="コンテンツ プレースホルダー 2"/>
@@ -5109,7 +5103,6 @@
               <a:rPr lang="ja-JP" altLang="en-US" dirty="0"/>
               <a:t>を用いる手法</a:t>
             </a:r>
-            <a:endParaRPr lang="ja-JP" altLang="en-US" dirty="0"/>
           </a:p>
         </p:txBody>
       </p:sp>
@@ -7069,7 +7062,6 @@
               <a:rPr lang="ja-JP" altLang="en-US" dirty="0"/>
               <a:t>を用いる手法</a:t>
             </a:r>
-            <a:endParaRPr lang="ja-JP" altLang="en-US" dirty="0"/>
           </a:p>
         </p:txBody>
       </p:sp>
@@ -8559,7 +8551,6 @@
               <a:rPr kumimoji="1" lang="ja-JP" altLang="en-US" sz="2800" dirty="0" smtClean="0"/>
               <a:t>勾配情報</a:t>
             </a:r>
-            <a:endParaRPr kumimoji="1" lang="ja-JP" altLang="en-US" sz="2800" dirty="0" smtClean="0"/>
           </a:p>
         </p:txBody>
       </p:sp>
@@ -8567,695 +8558,6 @@
     <p:extLst>
       <p:ext uri="{BB962C8B-B14F-4D97-AF65-F5344CB8AC3E}">
         <p14:creationId xmlns:p14="http://schemas.microsoft.com/office/powerpoint/2010/main" val="3926776264"/>
-      </p:ext>
-    </p:extLst>
-  </p:cSld>
-  <p:clrMapOvr>
-    <a:masterClrMapping/>
-  </p:clrMapOvr>
-  <p:timing>
-    <p:tnLst>
-      <p:par>
-        <p:cTn id="1" dur="indefinite" restart="never" nodeType="tmRoot"/>
-      </p:par>
-    </p:tnLst>
-  </p:timing>
-</p:sld>
-</file>
-
-<file path=ppt/slides/slide7.xml><?xml version="1.0" encoding="utf-8"?>
-<p:sld xmlns:a="http://schemas.openxmlformats.org/drawingml/2006/main" xmlns:r="http://schemas.openxmlformats.org/officeDocument/2006/relationships" xmlns:p="http://schemas.openxmlformats.org/presentationml/2006/main">
-  <p:cSld>
-    <p:spTree>
-      <p:nvGrpSpPr>
-        <p:cNvPr id="1" name=""/>
-        <p:cNvGrpSpPr/>
-        <p:nvPr/>
-      </p:nvGrpSpPr>
-      <p:grpSpPr>
-        <a:xfrm>
-          <a:off x="0" y="0"/>
-          <a:ext cx="0" cy="0"/>
-          <a:chOff x="0" y="0"/>
-          <a:chExt cx="0" cy="0"/>
-        </a:xfrm>
-      </p:grpSpPr>
-      <p:sp>
-        <p:nvSpPr>
-          <p:cNvPr id="2" name="タイトル 1"/>
-          <p:cNvSpPr>
-            <a:spLocks noGrp="1"/>
-          </p:cNvSpPr>
-          <p:nvPr>
-            <p:ph type="title"/>
-          </p:nvPr>
-        </p:nvSpPr>
-        <p:spPr/>
-        <p:txBody>
-          <a:bodyPr/>
-          <a:lstStyle/>
-          <a:p>
-            <a:r>
-              <a:rPr lang="en-US" altLang="ja-JP" sz="3800" dirty="0"/>
-              <a:t>Gradient-based One-Side Sampling</a:t>
-            </a:r>
-            <a:endParaRPr kumimoji="1" lang="ja-JP" altLang="en-US" sz="3800" dirty="0"/>
-          </a:p>
-        </p:txBody>
-      </p:sp>
-      <mc:AlternateContent xmlns:mc="http://schemas.openxmlformats.org/markup-compatibility/2006">
-        <mc:Choice xmlns:a14="http://schemas.microsoft.com/office/drawing/2010/main" Requires="a14">
-          <p:sp>
-            <p:nvSpPr>
-              <p:cNvPr id="3" name="コンテンツ プレースホルダー 2"/>
-              <p:cNvSpPr>
-                <a:spLocks noGrp="1"/>
-              </p:cNvSpPr>
-              <p:nvPr>
-                <p:ph idx="1"/>
-              </p:nvPr>
-            </p:nvSpPr>
-            <p:spPr/>
-            <p:txBody>
-              <a:bodyPr/>
-              <a:lstStyle/>
-              <a:p>
-                <a:r>
-                  <a:rPr lang="ja-JP" altLang="en-US" dirty="0" smtClean="0"/>
-                  <a:t>弱識別</a:t>
-                </a:r>
-                <a:r>
-                  <a:rPr lang="ja-JP" altLang="en-US" dirty="0"/>
-                  <a:t>器</a:t>
-                </a:r>
-                <a:r>
-                  <a:rPr lang="ja-JP" altLang="en-US" dirty="0" smtClean="0"/>
-                  <a:t>を追加する際，勾配が大きいデータに</a:t>
-                </a:r>
-                <a:r>
-                  <a:rPr lang="en-US" altLang="ja-JP" dirty="0" smtClean="0"/>
-                  <a:t/>
-                </a:r>
-                <a:br>
-                  <a:rPr lang="en-US" altLang="ja-JP" dirty="0" smtClean="0"/>
-                </a:br>
-                <a:r>
-                  <a:rPr lang="ja-JP" altLang="en-US" dirty="0" smtClean="0"/>
-                  <a:t>対して適応することが重要である．</a:t>
-                </a:r>
-                <a:endParaRPr lang="en-US" altLang="ja-JP" dirty="0" smtClean="0"/>
-              </a:p>
-              <a:p>
-                <a:r>
-                  <a:rPr kumimoji="1" lang="ja-JP" altLang="en-US" dirty="0" smtClean="0"/>
-                  <a:t>勾配の上位</a:t>
-                </a:r>
-                <a:r>
-                  <a:rPr kumimoji="1" lang="en-US" altLang="ja-JP" i="1" dirty="0" smtClean="0">
-                    <a:latin typeface="Times New Roman" panose="02020603050405020304" pitchFamily="18" charset="0"/>
-                    <a:cs typeface="Times New Roman" panose="02020603050405020304" pitchFamily="18" charset="0"/>
-                  </a:rPr>
-                  <a:t>a</a:t>
-                </a:r>
-                <a:r>
-                  <a:rPr kumimoji="1" lang="en-US" altLang="ja-JP" dirty="0" smtClean="0"/>
-                  <a:t>%</a:t>
-                </a:r>
-                <a:r>
-                  <a:rPr kumimoji="1" lang="ja-JP" altLang="en-US" dirty="0" smtClean="0"/>
-                  <a:t>のデータはすべて使用し，残りのデータから</a:t>
-                </a:r>
-                <a:r>
-                  <a:rPr kumimoji="1" lang="en-US" altLang="ja-JP" i="1" dirty="0" smtClean="0">
-                    <a:latin typeface="Times New Roman" panose="02020603050405020304" pitchFamily="18" charset="0"/>
-                    <a:cs typeface="Times New Roman" panose="02020603050405020304" pitchFamily="18" charset="0"/>
-                  </a:rPr>
-                  <a:t>b</a:t>
-                </a:r>
-                <a:r>
-                  <a:rPr kumimoji="1" lang="en-US" altLang="ja-JP" dirty="0" smtClean="0"/>
-                  <a:t>%</a:t>
-                </a:r>
-                <a:r>
-                  <a:rPr kumimoji="1" lang="ja-JP" altLang="en-US" dirty="0" smtClean="0"/>
-                  <a:t>をランダムサンプリングする．</a:t>
-                </a:r>
-                <a:endParaRPr kumimoji="1" lang="en-US" altLang="ja-JP" dirty="0" smtClean="0"/>
-              </a:p>
-              <a:p>
-                <a:r>
-                  <a:rPr lang="ja-JP" altLang="en-US" dirty="0" smtClean="0"/>
-                  <a:t>近似情報ゲイン</a:t>
-                </a:r>
-                <a:r>
-                  <a:rPr lang="en-US" altLang="ja-JP" dirty="0" smtClean="0"/>
-                  <a:t>(</a:t>
-                </a:r>
-                <a:r>
-                  <a:rPr lang="ja-JP" altLang="en-US" dirty="0" smtClean="0"/>
-                  <a:t>分散ゲイン</a:t>
-                </a:r>
-                <a:r>
-                  <a:rPr lang="en-US" altLang="ja-JP" dirty="0" smtClean="0"/>
-                  <a:t>)</a:t>
-                </a:r>
-                <a:r>
-                  <a:rPr lang="ja-JP" altLang="en-US" dirty="0" smtClean="0"/>
-                  <a:t>を以下のように定義</a:t>
-                </a:r>
-                <a:endParaRPr lang="en-US" altLang="ja-JP" dirty="0" smtClean="0"/>
-              </a:p>
-              <a:p>
-                <a14:m>
-                  <m:oMath xmlns:m="http://schemas.openxmlformats.org/officeDocument/2006/math">
-                    <m:r>
-                      <a:rPr kumimoji="1" lang="en-US" altLang="ja-JP" b="0" i="1" smtClean="0">
-                        <a:latin typeface="Cambria Math" panose="02040503050406030204" pitchFamily="18" charset="0"/>
-                      </a:rPr>
-                      <m:t>𝑉𝑗</m:t>
-                    </m:r>
-                    <m:d>
-                      <m:dPr>
-                        <m:ctrlPr>
-                          <a:rPr kumimoji="1" lang="en-US" altLang="ja-JP" b="0" i="1" smtClean="0">
-                            <a:latin typeface="Cambria Math" panose="02040503050406030204" pitchFamily="18" charset="0"/>
-                          </a:rPr>
-                        </m:ctrlPr>
-                      </m:dPr>
-                      <m:e>
-                        <m:r>
-                          <a:rPr kumimoji="1" lang="en-US" altLang="ja-JP" b="0" i="1" smtClean="0">
-                            <a:latin typeface="Cambria Math" panose="02040503050406030204" pitchFamily="18" charset="0"/>
-                          </a:rPr>
-                          <m:t>𝑑</m:t>
-                        </m:r>
-                      </m:e>
-                    </m:d>
-                    <m:r>
-                      <a:rPr kumimoji="1" lang="en-US" altLang="ja-JP" b="0" i="1" smtClean="0">
-                        <a:latin typeface="Cambria Math" panose="02040503050406030204" pitchFamily="18" charset="0"/>
-                      </a:rPr>
-                      <m:t>=</m:t>
-                    </m:r>
-                    <m:f>
-                      <m:fPr>
-                        <m:ctrlPr>
-                          <a:rPr kumimoji="1" lang="en-US" altLang="ja-JP" b="0" i="1" smtClean="0">
-                            <a:latin typeface="Cambria Math" panose="02040503050406030204" pitchFamily="18" charset="0"/>
-                          </a:rPr>
-                        </m:ctrlPr>
-                      </m:fPr>
-                      <m:num>
-                        <m:r>
-                          <a:rPr kumimoji="1" lang="en-US" altLang="ja-JP" b="0" i="1" smtClean="0">
-                            <a:latin typeface="Cambria Math" panose="02040503050406030204" pitchFamily="18" charset="0"/>
-                          </a:rPr>
-                          <m:t>1</m:t>
-                        </m:r>
-                      </m:num>
-                      <m:den>
-                        <m:r>
-                          <a:rPr kumimoji="1" lang="en-US" altLang="ja-JP" b="0" i="1" smtClean="0">
-                            <a:latin typeface="Cambria Math" panose="02040503050406030204" pitchFamily="18" charset="0"/>
-                          </a:rPr>
-                          <m:t>𝑛</m:t>
-                        </m:r>
-                      </m:den>
-                    </m:f>
-                    <m:r>
-                      <a:rPr kumimoji="1" lang="en-US" altLang="ja-JP" b="0" i="1" smtClean="0">
-                        <a:latin typeface="Cambria Math" panose="02040503050406030204" pitchFamily="18" charset="0"/>
-                      </a:rPr>
-                      <m:t>(</m:t>
-                    </m:r>
-                    <m:f>
-                      <m:fPr>
-                        <m:ctrlPr>
-                          <a:rPr lang="en-US" altLang="ja-JP" i="1">
-                            <a:latin typeface="Cambria Math" panose="02040503050406030204" pitchFamily="18" charset="0"/>
-                          </a:rPr>
-                        </m:ctrlPr>
-                      </m:fPr>
-                      <m:num>
-                        <m:d>
-                          <m:dPr>
-                            <m:ctrlPr>
-                              <a:rPr lang="en-US" altLang="ja-JP" i="1">
-                                <a:latin typeface="Cambria Math" panose="02040503050406030204" pitchFamily="18" charset="0"/>
-                              </a:rPr>
-                            </m:ctrlPr>
-                          </m:dPr>
-                          <m:e>
-                            <m:nary>
-                              <m:naryPr>
-                                <m:chr m:val="∑"/>
-                                <m:supHide m:val="on"/>
-                                <m:ctrlPr>
-                                  <a:rPr lang="en-US" altLang="ja-JP" i="1">
-                                    <a:latin typeface="Cambria Math" panose="02040503050406030204" pitchFamily="18" charset="0"/>
-                                  </a:rPr>
-                                </m:ctrlPr>
-                              </m:naryPr>
-                              <m:sub>
-                                <m:r>
-                                  <a:rPr lang="en-US" altLang="ja-JP" i="1">
-                                    <a:latin typeface="Cambria Math" panose="02040503050406030204" pitchFamily="18" charset="0"/>
-                                  </a:rPr>
-                                  <m:t>𝑥𝑖</m:t>
-                                </m:r>
-                                <m:r>
-                                  <a:rPr lang="en-US" altLang="ja-JP" i="1">
-                                    <a:latin typeface="Cambria Math" panose="02040503050406030204" pitchFamily="18" charset="0"/>
-                                    <a:ea typeface="Cambria Math" panose="02040503050406030204" pitchFamily="18" charset="0"/>
-                                  </a:rPr>
-                                  <m:t>∈</m:t>
-                                </m:r>
-                                <m:r>
-                                  <a:rPr lang="en-US" altLang="ja-JP" i="1">
-                                    <a:latin typeface="Cambria Math" panose="02040503050406030204" pitchFamily="18" charset="0"/>
-                                    <a:ea typeface="Cambria Math" panose="02040503050406030204" pitchFamily="18" charset="0"/>
-                                  </a:rPr>
-                                  <m:t>𝐴𝑙</m:t>
-                                </m:r>
-                              </m:sub>
-                              <m:sup/>
-                              <m:e>
-                                <m:r>
-                                  <a:rPr lang="en-US" altLang="ja-JP" i="1">
-                                    <a:latin typeface="Cambria Math" panose="02040503050406030204" pitchFamily="18" charset="0"/>
-                                    <a:ea typeface="Cambria Math" panose="02040503050406030204" pitchFamily="18" charset="0"/>
-                                  </a:rPr>
-                                  <m:t>𝑔𝑖</m:t>
-                                </m:r>
-                                <m:r>
-                                  <a:rPr lang="en-US" altLang="ja-JP" i="1">
-                                    <a:latin typeface="Cambria Math" panose="02040503050406030204" pitchFamily="18" charset="0"/>
-                                    <a:ea typeface="Cambria Math" panose="02040503050406030204" pitchFamily="18" charset="0"/>
-                                  </a:rPr>
-                                  <m:t>+</m:t>
-                                </m:r>
-                                <m:f>
-                                  <m:fPr>
-                                    <m:ctrlPr>
-                                      <a:rPr lang="en-US" altLang="ja-JP" i="1">
-                                        <a:latin typeface="Cambria Math" panose="02040503050406030204" pitchFamily="18" charset="0"/>
-                                        <a:ea typeface="Cambria Math" panose="02040503050406030204" pitchFamily="18" charset="0"/>
-                                      </a:rPr>
-                                    </m:ctrlPr>
-                                  </m:fPr>
-                                  <m:num>
-                                    <m:r>
-                                      <a:rPr lang="en-US" altLang="ja-JP" i="1">
-                                        <a:latin typeface="Cambria Math" panose="02040503050406030204" pitchFamily="18" charset="0"/>
-                                        <a:ea typeface="Cambria Math" panose="02040503050406030204" pitchFamily="18" charset="0"/>
-                                      </a:rPr>
-                                      <m:t>1−</m:t>
-                                    </m:r>
-                                    <m:r>
-                                      <a:rPr lang="en-US" altLang="ja-JP" i="1">
-                                        <a:latin typeface="Cambria Math" panose="02040503050406030204" pitchFamily="18" charset="0"/>
-                                        <a:ea typeface="Cambria Math" panose="02040503050406030204" pitchFamily="18" charset="0"/>
-                                      </a:rPr>
-                                      <m:t>𝑎</m:t>
-                                    </m:r>
-                                  </m:num>
-                                  <m:den>
-                                    <m:r>
-                                      <a:rPr lang="en-US" altLang="ja-JP" i="1">
-                                        <a:latin typeface="Cambria Math" panose="02040503050406030204" pitchFamily="18" charset="0"/>
-                                        <a:ea typeface="Cambria Math" panose="02040503050406030204" pitchFamily="18" charset="0"/>
-                                      </a:rPr>
-                                      <m:t>𝑏</m:t>
-                                    </m:r>
-                                  </m:den>
-                                </m:f>
-                                <m:nary>
-                                  <m:naryPr>
-                                    <m:chr m:val="∑"/>
-                                    <m:supHide m:val="on"/>
-                                    <m:ctrlPr>
-                                      <a:rPr lang="en-US" altLang="ja-JP" i="1">
-                                        <a:latin typeface="Cambria Math" panose="02040503050406030204" pitchFamily="18" charset="0"/>
-                                        <a:ea typeface="Cambria Math" panose="02040503050406030204" pitchFamily="18" charset="0"/>
-                                      </a:rPr>
-                                    </m:ctrlPr>
-                                  </m:naryPr>
-                                  <m:sub>
-                                    <m:r>
-                                      <a:rPr lang="en-US" altLang="ja-JP" i="1">
-                                        <a:latin typeface="Cambria Math" panose="02040503050406030204" pitchFamily="18" charset="0"/>
-                                        <a:ea typeface="Cambria Math" panose="02040503050406030204" pitchFamily="18" charset="0"/>
-                                      </a:rPr>
-                                      <m:t>𝑥𝑖</m:t>
-                                    </m:r>
-                                    <m:r>
-                                      <a:rPr lang="en-US" altLang="ja-JP" i="1">
-                                        <a:latin typeface="Cambria Math" panose="02040503050406030204" pitchFamily="18" charset="0"/>
-                                        <a:ea typeface="Cambria Math" panose="02040503050406030204" pitchFamily="18" charset="0"/>
-                                      </a:rPr>
-                                      <m:t>∈</m:t>
-                                    </m:r>
-                                    <m:r>
-                                      <a:rPr lang="en-US" altLang="ja-JP" i="1">
-                                        <a:latin typeface="Cambria Math" panose="02040503050406030204" pitchFamily="18" charset="0"/>
-                                        <a:ea typeface="Cambria Math" panose="02040503050406030204" pitchFamily="18" charset="0"/>
-                                      </a:rPr>
-                                      <m:t>𝐵𝑙</m:t>
-                                    </m:r>
-                                  </m:sub>
-                                  <m:sup/>
-                                  <m:e>
-                                    <m:r>
-                                      <a:rPr lang="en-US" altLang="ja-JP" i="1">
-                                        <a:latin typeface="Cambria Math" panose="02040503050406030204" pitchFamily="18" charset="0"/>
-                                        <a:ea typeface="Cambria Math" panose="02040503050406030204" pitchFamily="18" charset="0"/>
-                                      </a:rPr>
-                                      <m:t>𝑔𝑖</m:t>
-                                    </m:r>
-                                  </m:e>
-                                </m:nary>
-                              </m:e>
-                            </m:nary>
-                            <m:r>
-                              <a:rPr lang="en-US" altLang="ja-JP" i="1">
-                                <a:latin typeface="Cambria Math" panose="02040503050406030204" pitchFamily="18" charset="0"/>
-                                <a:ea typeface="Cambria Math" panose="02040503050406030204" pitchFamily="18" charset="0"/>
-                              </a:rPr>
-                              <m:t> </m:t>
-                            </m:r>
-                          </m:e>
-                        </m:d>
-                        <m:r>
-                          <a:rPr lang="en-US" altLang="ja-JP" i="1">
-                            <a:latin typeface="Cambria Math" panose="02040503050406030204" pitchFamily="18" charset="0"/>
-                            <a:ea typeface="Cambria Math" panose="02040503050406030204" pitchFamily="18" charset="0"/>
-                          </a:rPr>
-                          <m:t>2</m:t>
-                        </m:r>
-                      </m:num>
-                      <m:den>
-                        <m:r>
-                          <a:rPr lang="en-US" altLang="ja-JP" i="1">
-                            <a:latin typeface="Cambria Math" panose="02040503050406030204" pitchFamily="18" charset="0"/>
-                          </a:rPr>
-                          <m:t>𝑛𝑗𝑖</m:t>
-                        </m:r>
-                        <m:d>
-                          <m:dPr>
-                            <m:ctrlPr>
-                              <a:rPr lang="en-US" altLang="ja-JP" i="1">
-                                <a:latin typeface="Cambria Math" panose="02040503050406030204" pitchFamily="18" charset="0"/>
-                              </a:rPr>
-                            </m:ctrlPr>
-                          </m:dPr>
-                          <m:e>
-                            <m:r>
-                              <a:rPr lang="en-US" altLang="ja-JP" i="1">
-                                <a:latin typeface="Cambria Math" panose="02040503050406030204" pitchFamily="18" charset="0"/>
-                              </a:rPr>
-                              <m:t>𝑑</m:t>
-                            </m:r>
-                          </m:e>
-                        </m:d>
-                      </m:den>
-                    </m:f>
-                    <m:r>
-                      <a:rPr lang="en-US" altLang="ja-JP" i="1">
-                        <a:latin typeface="Cambria Math" panose="02040503050406030204" pitchFamily="18" charset="0"/>
-                      </a:rPr>
-                      <m:t>+</m:t>
-                    </m:r>
-                    <m:f>
-                      <m:fPr>
-                        <m:ctrlPr>
-                          <a:rPr lang="en-US" altLang="ja-JP" i="1">
-                            <a:latin typeface="Cambria Math" panose="02040503050406030204" pitchFamily="18" charset="0"/>
-                          </a:rPr>
-                        </m:ctrlPr>
-                      </m:fPr>
-                      <m:num>
-                        <m:d>
-                          <m:dPr>
-                            <m:ctrlPr>
-                              <a:rPr lang="en-US" altLang="ja-JP" i="1">
-                                <a:latin typeface="Cambria Math" panose="02040503050406030204" pitchFamily="18" charset="0"/>
-                              </a:rPr>
-                            </m:ctrlPr>
-                          </m:dPr>
-                          <m:e>
-                            <m:nary>
-                              <m:naryPr>
-                                <m:chr m:val="∑"/>
-                                <m:supHide m:val="on"/>
-                                <m:ctrlPr>
-                                  <a:rPr lang="en-US" altLang="ja-JP" i="1">
-                                    <a:latin typeface="Cambria Math" panose="02040503050406030204" pitchFamily="18" charset="0"/>
-                                  </a:rPr>
-                                </m:ctrlPr>
-                              </m:naryPr>
-                              <m:sub>
-                                <m:r>
-                                  <a:rPr lang="en-US" altLang="ja-JP" i="1">
-                                    <a:latin typeface="Cambria Math" panose="02040503050406030204" pitchFamily="18" charset="0"/>
-                                  </a:rPr>
-                                  <m:t>𝑥𝑖</m:t>
-                                </m:r>
-                                <m:r>
-                                  <a:rPr lang="en-US" altLang="ja-JP" i="1">
-                                    <a:latin typeface="Cambria Math" panose="02040503050406030204" pitchFamily="18" charset="0"/>
-                                    <a:ea typeface="Cambria Math" panose="02040503050406030204" pitchFamily="18" charset="0"/>
-                                  </a:rPr>
-                                  <m:t>∈</m:t>
-                                </m:r>
-                                <m:r>
-                                  <a:rPr lang="en-US" altLang="ja-JP" i="1">
-                                    <a:latin typeface="Cambria Math" panose="02040503050406030204" pitchFamily="18" charset="0"/>
-                                    <a:ea typeface="Cambria Math" panose="02040503050406030204" pitchFamily="18" charset="0"/>
-                                  </a:rPr>
-                                  <m:t>𝐴𝑟</m:t>
-                                </m:r>
-                              </m:sub>
-                              <m:sup/>
-                              <m:e>
-                                <m:r>
-                                  <a:rPr lang="en-US" altLang="ja-JP" i="1">
-                                    <a:latin typeface="Cambria Math" panose="02040503050406030204" pitchFamily="18" charset="0"/>
-                                    <a:ea typeface="Cambria Math" panose="02040503050406030204" pitchFamily="18" charset="0"/>
-                                  </a:rPr>
-                                  <m:t>𝑔𝑖</m:t>
-                                </m:r>
-                                <m:r>
-                                  <a:rPr lang="en-US" altLang="ja-JP" i="1">
-                                    <a:latin typeface="Cambria Math" panose="02040503050406030204" pitchFamily="18" charset="0"/>
-                                    <a:ea typeface="Cambria Math" panose="02040503050406030204" pitchFamily="18" charset="0"/>
-                                  </a:rPr>
-                                  <m:t>+</m:t>
-                                </m:r>
-                                <m:f>
-                                  <m:fPr>
-                                    <m:ctrlPr>
-                                      <a:rPr lang="en-US" altLang="ja-JP" i="1">
-                                        <a:latin typeface="Cambria Math" panose="02040503050406030204" pitchFamily="18" charset="0"/>
-                                        <a:ea typeface="Cambria Math" panose="02040503050406030204" pitchFamily="18" charset="0"/>
-                                      </a:rPr>
-                                    </m:ctrlPr>
-                                  </m:fPr>
-                                  <m:num>
-                                    <m:r>
-                                      <a:rPr lang="en-US" altLang="ja-JP" i="1">
-                                        <a:latin typeface="Cambria Math" panose="02040503050406030204" pitchFamily="18" charset="0"/>
-                                        <a:ea typeface="Cambria Math" panose="02040503050406030204" pitchFamily="18" charset="0"/>
-                                      </a:rPr>
-                                      <m:t>1−</m:t>
-                                    </m:r>
-                                    <m:r>
-                                      <a:rPr lang="en-US" altLang="ja-JP" i="1">
-                                        <a:latin typeface="Cambria Math" panose="02040503050406030204" pitchFamily="18" charset="0"/>
-                                        <a:ea typeface="Cambria Math" panose="02040503050406030204" pitchFamily="18" charset="0"/>
-                                      </a:rPr>
-                                      <m:t>𝑎</m:t>
-                                    </m:r>
-                                  </m:num>
-                                  <m:den>
-                                    <m:r>
-                                      <a:rPr lang="en-US" altLang="ja-JP" i="1">
-                                        <a:latin typeface="Cambria Math" panose="02040503050406030204" pitchFamily="18" charset="0"/>
-                                        <a:ea typeface="Cambria Math" panose="02040503050406030204" pitchFamily="18" charset="0"/>
-                                      </a:rPr>
-                                      <m:t>𝑏</m:t>
-                                    </m:r>
-                                  </m:den>
-                                </m:f>
-                                <m:nary>
-                                  <m:naryPr>
-                                    <m:chr m:val="∑"/>
-                                    <m:supHide m:val="on"/>
-                                    <m:ctrlPr>
-                                      <a:rPr lang="en-US" altLang="ja-JP" i="1" smtClean="0">
-                                        <a:latin typeface="Cambria Math" panose="02040503050406030204" pitchFamily="18" charset="0"/>
-                                        <a:ea typeface="Cambria Math" panose="02040503050406030204" pitchFamily="18" charset="0"/>
-                                      </a:rPr>
-                                    </m:ctrlPr>
-                                  </m:naryPr>
-                                  <m:sub>
-                                    <m:r>
-                                      <a:rPr lang="en-US" altLang="ja-JP" b="0" i="1" smtClean="0">
-                                        <a:latin typeface="Cambria Math" panose="02040503050406030204" pitchFamily="18" charset="0"/>
-                                        <a:ea typeface="Cambria Math" panose="02040503050406030204" pitchFamily="18" charset="0"/>
-                                      </a:rPr>
-                                      <m:t>𝑥</m:t>
-                                    </m:r>
-                                    <m:r>
-                                      <a:rPr lang="en-US" altLang="ja-JP" i="1">
-                                        <a:latin typeface="Cambria Math" panose="02040503050406030204" pitchFamily="18" charset="0"/>
-                                        <a:ea typeface="Cambria Math" panose="02040503050406030204" pitchFamily="18" charset="0"/>
-                                      </a:rPr>
-                                      <m:t>𝑖</m:t>
-                                    </m:r>
-                                    <m:r>
-                                      <a:rPr lang="en-US" altLang="ja-JP" i="1">
-                                        <a:latin typeface="Cambria Math" panose="02040503050406030204" pitchFamily="18" charset="0"/>
-                                        <a:ea typeface="Cambria Math" panose="02040503050406030204" pitchFamily="18" charset="0"/>
-                                      </a:rPr>
-                                      <m:t>∈</m:t>
-                                    </m:r>
-                                    <m:r>
-                                      <a:rPr lang="en-US" altLang="ja-JP" i="1">
-                                        <a:latin typeface="Cambria Math" panose="02040503050406030204" pitchFamily="18" charset="0"/>
-                                        <a:ea typeface="Cambria Math" panose="02040503050406030204" pitchFamily="18" charset="0"/>
-                                      </a:rPr>
-                                      <m:t>𝐵𝑟</m:t>
-                                    </m:r>
-                                  </m:sub>
-                                  <m:sup/>
-                                  <m:e>
-                                    <m:r>
-                                      <a:rPr lang="en-US" altLang="ja-JP" i="1">
-                                        <a:latin typeface="Cambria Math" panose="02040503050406030204" pitchFamily="18" charset="0"/>
-                                        <a:ea typeface="Cambria Math" panose="02040503050406030204" pitchFamily="18" charset="0"/>
-                                      </a:rPr>
-                                      <m:t>𝑔𝑖</m:t>
-                                    </m:r>
-                                  </m:e>
-                                </m:nary>
-                              </m:e>
-                            </m:nary>
-                            <m:r>
-                              <a:rPr lang="en-US" altLang="ja-JP" i="1">
-                                <a:latin typeface="Cambria Math" panose="02040503050406030204" pitchFamily="18" charset="0"/>
-                                <a:ea typeface="Cambria Math" panose="02040503050406030204" pitchFamily="18" charset="0"/>
-                              </a:rPr>
-                              <m:t> </m:t>
-                            </m:r>
-                          </m:e>
-                        </m:d>
-                        <m:r>
-                          <a:rPr lang="en-US" altLang="ja-JP" i="1">
-                            <a:latin typeface="Cambria Math" panose="02040503050406030204" pitchFamily="18" charset="0"/>
-                            <a:ea typeface="Cambria Math" panose="02040503050406030204" pitchFamily="18" charset="0"/>
-                          </a:rPr>
-                          <m:t>2</m:t>
-                        </m:r>
-                      </m:num>
-                      <m:den>
-                        <m:r>
-                          <a:rPr lang="en-US" altLang="ja-JP" i="1">
-                            <a:latin typeface="Cambria Math" panose="02040503050406030204" pitchFamily="18" charset="0"/>
-                          </a:rPr>
-                          <m:t>𝑛𝑗𝑖</m:t>
-                        </m:r>
-                        <m:d>
-                          <m:dPr>
-                            <m:ctrlPr>
-                              <a:rPr lang="en-US" altLang="ja-JP" i="1">
-                                <a:latin typeface="Cambria Math" panose="02040503050406030204" pitchFamily="18" charset="0"/>
-                              </a:rPr>
-                            </m:ctrlPr>
-                          </m:dPr>
-                          <m:e>
-                            <m:r>
-                              <a:rPr lang="en-US" altLang="ja-JP" i="1">
-                                <a:latin typeface="Cambria Math" panose="02040503050406030204" pitchFamily="18" charset="0"/>
-                              </a:rPr>
-                              <m:t>𝑑</m:t>
-                            </m:r>
-                          </m:e>
-                        </m:d>
-                      </m:den>
-                    </m:f>
-                  </m:oMath>
-                </a14:m>
-                <a:r>
-                  <a:rPr kumimoji="1" lang="en-US" altLang="ja-JP" dirty="0" smtClean="0"/>
-                  <a:t>)</a:t>
-                </a:r>
-                <a:endParaRPr kumimoji="1" lang="ja-JP" altLang="en-US" dirty="0"/>
-              </a:p>
-            </p:txBody>
-          </p:sp>
-        </mc:Choice>
-        <mc:Fallback>
-          <p:sp>
-            <p:nvSpPr>
-              <p:cNvPr id="3" name="コンテンツ プレースホルダー 2"/>
-              <p:cNvSpPr>
-                <a:spLocks noGrp="1" noRot="1" noChangeAspect="1" noMove="1" noResize="1" noEditPoints="1" noAdjustHandles="1" noChangeArrowheads="1" noChangeShapeType="1" noTextEdit="1"/>
-              </p:cNvSpPr>
-              <p:nvPr>
-                <p:ph idx="1"/>
-              </p:nvPr>
-            </p:nvSpPr>
-            <p:spPr>
-              <a:blipFill rotWithShape="0">
-                <a:blip r:embed="rId2"/>
-                <a:stretch>
-                  <a:fillRect l="-1825" t="-1882" r="-1754"/>
-                </a:stretch>
-              </a:blipFill>
-            </p:spPr>
-            <p:txBody>
-              <a:bodyPr/>
-              <a:lstStyle/>
-              <a:p>
-                <a:r>
-                  <a:rPr lang="ja-JP" altLang="en-US">
-                    <a:noFill/>
-                  </a:rPr>
-                  <a:t> </a:t>
-                </a:r>
-              </a:p>
-            </p:txBody>
-          </p:sp>
-        </mc:Fallback>
-      </mc:AlternateContent>
-      <p:sp>
-        <p:nvSpPr>
-          <p:cNvPr id="4" name="スライド番号プレースホルダー 3"/>
-          <p:cNvSpPr>
-            <a:spLocks noGrp="1"/>
-          </p:cNvSpPr>
-          <p:nvPr>
-            <p:ph type="sldNum" sz="quarter" idx="12"/>
-          </p:nvPr>
-        </p:nvSpPr>
-        <p:spPr/>
-        <p:txBody>
-          <a:bodyPr/>
-          <a:lstStyle/>
-          <a:p>
-            <a:fld id="{B5C67937-D10B-4F1B-BCB2-26B69D4AE1E2}" type="slidenum">
-              <a:rPr kumimoji="1" lang="ja-JP" altLang="en-US" smtClean="0"/>
-              <a:pPr/>
-              <a:t>7</a:t>
-            </a:fld>
-            <a:endParaRPr kumimoji="1" lang="ja-JP" altLang="en-US" dirty="0"/>
-          </a:p>
-        </p:txBody>
-      </p:sp>
-    </p:spTree>
-    <p:extLst>
-      <p:ext uri="{BB962C8B-B14F-4D97-AF65-F5344CB8AC3E}">
-        <p14:creationId xmlns:p14="http://schemas.microsoft.com/office/powerpoint/2010/main" val="2335747032"/>
       </p:ext>
     </p:extLst>
   </p:cSld>

</xml_diff>